<commit_message>
Update Tournament Generator Presentation.pptx
Presentation
</commit_message>
<xml_diff>
--- a/notes/Tournament Generator Presentation.pptx
+++ b/notes/Tournament Generator Presentation.pptx
@@ -105,6 +105,11 @@
       </a:defRPr>
     </a:lvl9pPr>
   </p:defaultTextStyle>
+  <p:extLst>
+    <p:ext uri="{EFAFB233-063F-42B5-8137-9DF3F51BA10A}">
+      <p15:sldGuideLst xmlns:p15="http://schemas.microsoft.com/office/powerpoint/2012/main"/>
+    </p:ext>
+  </p:extLst>
 </p:presentation>
 </file>
 
@@ -3749,10 +3754,73 @@
           <a:bodyPr/>
           <a:lstStyle/>
           <a:p>
-            <a:endParaRPr lang="en-GB" dirty="0"/>
-          </a:p>
-        </p:txBody>
-      </p:sp>
+            <a:r>
+              <a:rPr lang="en-GB" dirty="0"/>
+              <a:t>Functionality (with live demonstration) (Fabio)</a:t>
+            </a:r>
+          </a:p>
+          <a:p>
+            <a:r>
+              <a:rPr lang="en-GB" dirty="0"/>
+              <a:t>Documentation (flow chart, description, project aim) (FABIO)</a:t>
+            </a:r>
+          </a:p>
+          <a:p>
+            <a:r>
+              <a:rPr lang="en-GB" dirty="0"/>
+              <a:t>Challenges (what went well, what not) (LUCY)</a:t>
+            </a:r>
+          </a:p>
+          <a:p>
+            <a:r>
+              <a:rPr lang="en-GB" dirty="0"/>
+              <a:t>Code quality (screenshots from phyton) (LUCY)</a:t>
+            </a:r>
+          </a:p>
+          <a:p>
+            <a:r>
+              <a:rPr lang="en-GB" dirty="0"/>
+              <a:t>What are we proud of (ALEX)</a:t>
+            </a:r>
+          </a:p>
+          <a:p>
+            <a:r>
+              <a:rPr lang="en-GB" dirty="0"/>
+              <a:t>Show version control? (Screenshots or GitHub?) (ALEX)</a:t>
+            </a:r>
+          </a:p>
+        </p:txBody>
+      </p:sp>
+      <p:pic>
+        <p:nvPicPr>
+          <p:cNvPr id="5" name="Grafik 4">
+            <a:extLst>
+              <a:ext uri="{FF2B5EF4-FFF2-40B4-BE49-F238E27FC236}">
+                <a16:creationId xmlns:a16="http://schemas.microsoft.com/office/drawing/2014/main" id="{4F121C67-65FA-4CE2-8526-45F189FE442E}"/>
+              </a:ext>
+            </a:extLst>
+          </p:cNvPr>
+          <p:cNvPicPr>
+            <a:picLocks noChangeAspect="1"/>
+          </p:cNvPicPr>
+          <p:nvPr/>
+        </p:nvPicPr>
+        <p:blipFill>
+          <a:blip r:embed="rId2"/>
+          <a:stretch>
+            <a:fillRect/>
+          </a:stretch>
+        </p:blipFill>
+        <p:spPr>
+          <a:xfrm>
+            <a:off x="838200" y="4939916"/>
+            <a:ext cx="3349841" cy="1763767"/>
+          </a:xfrm>
+          <a:prstGeom prst="rect">
+            <a:avLst/>
+          </a:prstGeom>
+        </p:spPr>
+      </p:pic>
     </p:spTree>
     <p:extLst>
       <p:ext uri="{BB962C8B-B14F-4D97-AF65-F5344CB8AC3E}">

</xml_diff>

<commit_message>
Added Highlights, VersionControll in PPT
</commit_message>
<xml_diff>
--- a/notes/Tournament Generator Presentation.pptx
+++ b/notes/Tournament Generator Presentation.pptx
@@ -4295,13 +4295,13 @@
   <p:clrMapOvr>
     <a:masterClrMapping/>
   </p:clrMapOvr>
-  <mc:AlternateContent xmlns:mc="http://schemas.openxmlformats.org/markup-compatibility/2006">
-    <mc:Choice xmlns:p14="http://schemas.microsoft.com/office/powerpoint/2010/main" Requires="p14">
+  <mc:AlternateContent xmlns:mc="http://schemas.openxmlformats.org/markup-compatibility/2006" xmlns:p14="http://schemas.microsoft.com/office/powerpoint/2010/main">
+    <mc:Choice Requires="p14">
       <p:transition spd="med" p14:dur="700">
         <p:fade/>
       </p:transition>
     </mc:Choice>
-    <mc:Fallback>
+    <mc:Fallback xmlns="">
       <p:transition spd="med">
         <p:fade/>
       </p:transition>
@@ -4504,13 +4504,13 @@
   <p:clrMapOvr>
     <a:masterClrMapping/>
   </p:clrMapOvr>
-  <mc:AlternateContent xmlns:mc="http://schemas.openxmlformats.org/markup-compatibility/2006">
-    <mc:Choice xmlns:p14="http://schemas.microsoft.com/office/powerpoint/2010/main" Requires="p14">
+  <mc:AlternateContent xmlns:mc="http://schemas.openxmlformats.org/markup-compatibility/2006" xmlns:p14="http://schemas.microsoft.com/office/powerpoint/2010/main">
+    <mc:Choice Requires="p14">
       <p:transition spd="med" p14:dur="700">
         <p:fade/>
       </p:transition>
     </mc:Choice>
-    <mc:Fallback>
+    <mc:Fallback xmlns="">
       <p:transition spd="med">
         <p:fade/>
       </p:transition>
@@ -4768,13 +4768,13 @@
   <p:clrMapOvr>
     <a:masterClrMapping/>
   </p:clrMapOvr>
-  <mc:AlternateContent xmlns:mc="http://schemas.openxmlformats.org/markup-compatibility/2006">
-    <mc:Choice xmlns:p14="http://schemas.microsoft.com/office/powerpoint/2010/main" Requires="p14">
+  <mc:AlternateContent xmlns:mc="http://schemas.openxmlformats.org/markup-compatibility/2006" xmlns:p14="http://schemas.microsoft.com/office/powerpoint/2010/main">
+    <mc:Choice Requires="p14">
       <p:transition spd="med" p14:dur="700">
         <p:fade/>
       </p:transition>
     </mc:Choice>
-    <mc:Fallback>
+    <mc:Fallback xmlns="">
       <p:transition spd="med">
         <p:fade/>
       </p:transition>
@@ -5026,13 +5026,13 @@
   <p:clrMapOvr>
     <a:masterClrMapping/>
   </p:clrMapOvr>
-  <mc:AlternateContent xmlns:mc="http://schemas.openxmlformats.org/markup-compatibility/2006">
-    <mc:Choice xmlns:p14="http://schemas.microsoft.com/office/powerpoint/2010/main" Requires="p14">
+  <mc:AlternateContent xmlns:mc="http://schemas.openxmlformats.org/markup-compatibility/2006" xmlns:p14="http://schemas.microsoft.com/office/powerpoint/2010/main">
+    <mc:Choice Requires="p14">
       <p:transition spd="med" p14:dur="700">
         <p:fade/>
       </p:transition>
     </mc:Choice>
-    <mc:Fallback>
+    <mc:Fallback xmlns="">
       <p:transition spd="med">
         <p:fade/>
       </p:transition>
@@ -5255,13 +5255,13 @@
   <p:clrMapOvr>
     <a:masterClrMapping/>
   </p:clrMapOvr>
-  <mc:AlternateContent xmlns:mc="http://schemas.openxmlformats.org/markup-compatibility/2006">
-    <mc:Choice xmlns:p14="http://schemas.microsoft.com/office/powerpoint/2010/main" Requires="p14">
+  <mc:AlternateContent xmlns:mc="http://schemas.openxmlformats.org/markup-compatibility/2006" xmlns:p14="http://schemas.microsoft.com/office/powerpoint/2010/main">
+    <mc:Choice Requires="p14">
       <p:transition spd="med" p14:dur="700">
         <p:fade/>
       </p:transition>
     </mc:Choice>
-    <mc:Fallback>
+    <mc:Fallback xmlns="">
       <p:transition spd="med">
         <p:fade/>
       </p:transition>
@@ -5423,13 +5423,13 @@
   <p:clrMapOvr>
     <a:masterClrMapping/>
   </p:clrMapOvr>
-  <mc:AlternateContent xmlns:mc="http://schemas.openxmlformats.org/markup-compatibility/2006">
-    <mc:Choice xmlns:p14="http://schemas.microsoft.com/office/powerpoint/2010/main" Requires="p14">
+  <mc:AlternateContent xmlns:mc="http://schemas.openxmlformats.org/markup-compatibility/2006" xmlns:p14="http://schemas.microsoft.com/office/powerpoint/2010/main">
+    <mc:Choice Requires="p14">
       <p:transition spd="med" p14:dur="700">
         <p:fade/>
       </p:transition>
     </mc:Choice>
-    <mc:Fallback>
+    <mc:Fallback xmlns="">
       <p:transition spd="med">
         <p:fade/>
       </p:transition>
@@ -5581,13 +5581,13 @@
   <p:clrMapOvr>
     <a:masterClrMapping/>
   </p:clrMapOvr>
-  <mc:AlternateContent xmlns:mc="http://schemas.openxmlformats.org/markup-compatibility/2006">
-    <mc:Choice xmlns:p14="http://schemas.microsoft.com/office/powerpoint/2010/main" Requires="p14">
+  <mc:AlternateContent xmlns:mc="http://schemas.openxmlformats.org/markup-compatibility/2006" xmlns:p14="http://schemas.microsoft.com/office/powerpoint/2010/main">
+    <mc:Choice Requires="p14">
       <p:transition spd="med" p14:dur="700">
         <p:fade/>
       </p:transition>
     </mc:Choice>
-    <mc:Fallback>
+    <mc:Fallback xmlns="">
       <p:transition spd="med">
         <p:fade/>
       </p:transition>
@@ -5740,13 +5740,13 @@
   <p:clrMapOvr>
     <a:masterClrMapping/>
   </p:clrMapOvr>
-  <mc:AlternateContent xmlns:mc="http://schemas.openxmlformats.org/markup-compatibility/2006">
-    <mc:Choice xmlns:p14="http://schemas.microsoft.com/office/powerpoint/2010/main" Requires="p14">
+  <mc:AlternateContent xmlns:mc="http://schemas.openxmlformats.org/markup-compatibility/2006" xmlns:p14="http://schemas.microsoft.com/office/powerpoint/2010/main">
+    <mc:Choice Requires="p14">
       <p:transition spd="med" p14:dur="700">
         <p:fade/>
       </p:transition>
     </mc:Choice>
-    <mc:Fallback>
+    <mc:Fallback xmlns="">
       <p:transition spd="med">
         <p:fade/>
       </p:transition>
@@ -5823,8 +5823,46 @@
           <a:p>
             <a:r>
               <a:rPr lang="en-GB" dirty="0"/>
-              <a:t>What are we proud of?</a:t>
-            </a:r>
+              <a:t>Tournament Tree</a:t>
+            </a:r>
+          </a:p>
+          <a:p>
+            <a:r>
+              <a:rPr lang="en-GB" dirty="0"/>
+              <a:t>Autofill</a:t>
+            </a:r>
+          </a:p>
+          <a:p>
+            <a:pPr marL="0" indent="0">
+              <a:buNone/>
+            </a:pPr>
+            <a:endParaRPr lang="en-GB" dirty="0"/>
+          </a:p>
+          <a:p>
+            <a:r>
+              <a:rPr lang="en-GB" dirty="0"/>
+              <a:t>Achievements:</a:t>
+            </a:r>
+          </a:p>
+          <a:p>
+            <a:pPr lvl="1"/>
+            <a:r>
+              <a:rPr lang="en-GB" dirty="0"/>
+              <a:t>Nice project with no experience</a:t>
+            </a:r>
+          </a:p>
+          <a:p>
+            <a:pPr lvl="1"/>
+            <a:r>
+              <a:rPr lang="en-GB" dirty="0"/>
+              <a:t>Almost all requirements fulfilled</a:t>
+            </a:r>
+          </a:p>
+          <a:p>
+            <a:pPr marL="0" indent="0">
+              <a:buNone/>
+            </a:pPr>
+            <a:endParaRPr lang="en-GB" dirty="0"/>
           </a:p>
         </p:txBody>
       </p:sp>
@@ -5901,13 +5939,13 @@
   <p:clrMapOvr>
     <a:masterClrMapping/>
   </p:clrMapOvr>
-  <mc:AlternateContent xmlns:mc="http://schemas.openxmlformats.org/markup-compatibility/2006">
-    <mc:Choice xmlns:p14="http://schemas.microsoft.com/office/powerpoint/2010/main" Requires="p14">
+  <mc:AlternateContent xmlns:mc="http://schemas.openxmlformats.org/markup-compatibility/2006" xmlns:p14="http://schemas.microsoft.com/office/powerpoint/2010/main">
+    <mc:Choice Requires="p14">
       <p:transition spd="med" p14:dur="700">
         <p:fade/>
       </p:transition>
     </mc:Choice>
-    <mc:Fallback>
+    <mc:Fallback xmlns="">
       <p:transition spd="med">
         <p:fade/>
       </p:transition>
@@ -5982,7 +6020,16 @@
           <a:bodyPr/>
           <a:lstStyle/>
           <a:p>
-            <a:endParaRPr lang="en-GB"/>
+            <a:r>
+              <a:rPr lang="en-GB" dirty="0">
+                <a:hlinkClick r:id="rId2"/>
+              </a:rPr>
+              <a:t>https://github.com/BuecAle/TournamentGenerator_ISD/</a:t>
+            </a:r>
+            <a:endParaRPr lang="en-GB" dirty="0"/>
+          </a:p>
+          <a:p>
+            <a:endParaRPr lang="en-GB" dirty="0"/>
           </a:p>
         </p:txBody>
       </p:sp>
@@ -6059,13 +6106,13 @@
   <p:clrMapOvr>
     <a:masterClrMapping/>
   </p:clrMapOvr>
-  <mc:AlternateContent xmlns:mc="http://schemas.openxmlformats.org/markup-compatibility/2006">
-    <mc:Choice xmlns:p14="http://schemas.microsoft.com/office/powerpoint/2010/main" Requires="p14">
+  <mc:AlternateContent xmlns:mc="http://schemas.openxmlformats.org/markup-compatibility/2006" xmlns:p14="http://schemas.microsoft.com/office/powerpoint/2010/main">
+    <mc:Choice Requires="p14">
       <p:transition spd="med" p14:dur="700">
         <p:fade/>
       </p:transition>
     </mc:Choice>
-    <mc:Fallback>
+    <mc:Fallback xmlns="">
       <p:transition spd="med">
         <p:fade/>
       </p:transition>

</xml_diff>